<commit_message>
Pequeños cambios sin importancia
</commit_message>
<xml_diff>
--- a/Git y GitHub 1.-Empezando.pptx
+++ b/Git y GitHub 1.-Empezando.pptx
@@ -8040,7 +8040,7 @@
           <a:p>
             <a:fld id="{E574AC39-44E6-425E-AF49-CF7D189F346F}" type="datetimeFigureOut">
               <a:rPr lang="en-US" smtClean="0"/>
-              <a:t>3/11/2017</a:t>
+              <a:t>3/19/2017</a:t>
             </a:fld>
             <a:endParaRPr lang="en-US"/>
           </a:p>
@@ -8205,7 +8205,7 @@
           <a:p>
             <a:fld id="{DF2775BC-6312-42C7-B7C5-EA6783C2D9CA}" type="datetimeFigureOut">
               <a:rPr lang="en-US" smtClean="0"/>
-              <a:t>3/11/2017</a:t>
+              <a:t>3/19/2017</a:t>
             </a:fld>
             <a:endParaRPr lang="en-US"/>
           </a:p>
@@ -8655,7 +8655,7 @@
           <a:p>
             <a:fld id="{40FF0622-75E4-48B8-A617-5428CA5926CE}" type="datetimeFigureOut">
               <a:rPr lang="en-US" smtClean="0"/>
-              <a:t>3/11/2017</a:t>
+              <a:t>3/19/2017</a:t>
             </a:fld>
             <a:endParaRPr lang="en-US"/>
           </a:p>
@@ -8930,7 +8930,7 @@
           <a:p>
             <a:fld id="{40FF0622-75E4-48B8-A617-5428CA5926CE}" type="datetimeFigureOut">
               <a:rPr lang="en-US" smtClean="0"/>
-              <a:t>3/11/2017</a:t>
+              <a:t>3/19/2017</a:t>
             </a:fld>
             <a:endParaRPr lang="en-US"/>
           </a:p>
@@ -9057,7 +9057,7 @@
           <a:p>
             <a:fld id="{40FF0622-75E4-48B8-A617-5428CA5926CE}" type="datetimeFigureOut">
               <a:rPr lang="en-US" smtClean="0"/>
-              <a:t>3/11/2017</a:t>
+              <a:t>3/19/2017</a:t>
             </a:fld>
             <a:endParaRPr lang="en-US"/>
           </a:p>
@@ -9251,7 +9251,7 @@
           <a:p>
             <a:fld id="{40FF0622-75E4-48B8-A617-5428CA5926CE}" type="datetimeFigureOut">
               <a:rPr lang="en-US" smtClean="0"/>
-              <a:t>3/11/2017</a:t>
+              <a:t>3/19/2017</a:t>
             </a:fld>
             <a:endParaRPr lang="en-US"/>
           </a:p>
@@ -9736,7 +9736,7 @@
           <a:p>
             <a:fld id="{40FF0622-75E4-48B8-A617-5428CA5926CE}" type="datetimeFigureOut">
               <a:rPr lang="en-US" smtClean="0"/>
-              <a:t>3/11/2017</a:t>
+              <a:t>3/19/2017</a:t>
             </a:fld>
             <a:endParaRPr lang="en-US"/>
           </a:p>
@@ -9863,7 +9863,7 @@
           <a:p>
             <a:fld id="{40FF0622-75E4-48B8-A617-5428CA5926CE}" type="datetimeFigureOut">
               <a:rPr lang="en-US" smtClean="0"/>
-              <a:t>3/11/2017</a:t>
+              <a:t>3/19/2017</a:t>
             </a:fld>
             <a:endParaRPr lang="en-US"/>
           </a:p>
@@ -10164,7 +10164,7 @@
           <a:p>
             <a:fld id="{40FF0622-75E4-48B8-A617-5428CA5926CE}" type="datetimeFigureOut">
               <a:rPr lang="en-US" smtClean="0"/>
-              <a:t>3/11/2017</a:t>
+              <a:t>3/19/2017</a:t>
             </a:fld>
             <a:endParaRPr lang="en-US"/>
           </a:p>
@@ -10915,7 +10915,7 @@
           <a:p>
             <a:fld id="{40FF0622-75E4-48B8-A617-5428CA5926CE}" type="datetimeFigureOut">
               <a:rPr lang="en-US" smtClean="0"/>
-              <a:t>3/11/2017</a:t>
+              <a:t>3/19/2017</a:t>
             </a:fld>
             <a:endParaRPr lang="en-US"/>
           </a:p>
@@ -11762,7 +11762,7 @@
           <a:p>
             <a:fld id="{40FF0622-75E4-48B8-A617-5428CA5926CE}" type="datetimeFigureOut">
               <a:rPr lang="en-US" smtClean="0"/>
-              <a:t>3/11/2017</a:t>
+              <a:t>3/19/2017</a:t>
             </a:fld>
             <a:endParaRPr lang="en-US"/>
           </a:p>
@@ -11936,7 +11936,7 @@
           <a:p>
             <a:fld id="{40FF0622-75E4-48B8-A617-5428CA5926CE}" type="datetimeFigureOut">
               <a:rPr lang="en-US" smtClean="0"/>
-              <a:t>3/11/2017</a:t>
+              <a:t>3/19/2017</a:t>
             </a:fld>
             <a:endParaRPr lang="en-US"/>
           </a:p>
@@ -12120,7 +12120,7 @@
           <a:p>
             <a:fld id="{40FF0622-75E4-48B8-A617-5428CA5926CE}" type="datetimeFigureOut">
               <a:rPr lang="en-US" smtClean="0"/>
-              <a:t>3/11/2017</a:t>
+              <a:t>3/19/2017</a:t>
             </a:fld>
             <a:endParaRPr lang="en-US"/>
           </a:p>
@@ -12286,7 +12286,7 @@
           <a:p>
             <a:fld id="{40FF0622-75E4-48B8-A617-5428CA5926CE}" type="datetimeFigureOut">
               <a:rPr lang="en-US" smtClean="0"/>
-              <a:t>3/11/2017</a:t>
+              <a:t>3/19/2017</a:t>
             </a:fld>
             <a:endParaRPr lang="en-US"/>
           </a:p>
@@ -12554,7 +12554,7 @@
           <a:p>
             <a:fld id="{40FF0622-75E4-48B8-A617-5428CA5926CE}" type="datetimeFigureOut">
               <a:rPr lang="en-US" smtClean="0"/>
-              <a:t>3/11/2017</a:t>
+              <a:t>3/19/2017</a:t>
             </a:fld>
             <a:endParaRPr lang="en-US"/>
           </a:p>
@@ -12846,7 +12846,7 @@
           <a:p>
             <a:fld id="{40FF0622-75E4-48B8-A617-5428CA5926CE}" type="datetimeFigureOut">
               <a:rPr lang="en-US" smtClean="0"/>
-              <a:t>3/11/2017</a:t>
+              <a:t>3/19/2017</a:t>
             </a:fld>
             <a:endParaRPr lang="en-US"/>
           </a:p>
@@ -13284,7 +13284,7 @@
           <a:p>
             <a:fld id="{40FF0622-75E4-48B8-A617-5428CA5926CE}" type="datetimeFigureOut">
               <a:rPr lang="en-US" smtClean="0"/>
-              <a:t>3/11/2017</a:t>
+              <a:t>3/19/2017</a:t>
             </a:fld>
             <a:endParaRPr lang="en-US"/>
           </a:p>
@@ -13402,7 +13402,7 @@
           <a:p>
             <a:fld id="{40FF0622-75E4-48B8-A617-5428CA5926CE}" type="datetimeFigureOut">
               <a:rPr lang="en-US" smtClean="0"/>
-              <a:t>3/11/2017</a:t>
+              <a:t>3/19/2017</a:t>
             </a:fld>
             <a:endParaRPr lang="en-US"/>
           </a:p>
@@ -13497,7 +13497,7 @@
           <a:p>
             <a:fld id="{40FF0622-75E4-48B8-A617-5428CA5926CE}" type="datetimeFigureOut">
               <a:rPr lang="en-US" smtClean="0"/>
-              <a:t>3/11/2017</a:t>
+              <a:t>3/19/2017</a:t>
             </a:fld>
             <a:endParaRPr lang="en-US"/>
           </a:p>
@@ -13772,7 +13772,7 @@
           <a:p>
             <a:fld id="{40FF0622-75E4-48B8-A617-5428CA5926CE}" type="datetimeFigureOut">
               <a:rPr lang="en-US" smtClean="0"/>
-              <a:t>3/11/2017</a:t>
+              <a:t>3/19/2017</a:t>
             </a:fld>
             <a:endParaRPr lang="en-US"/>
           </a:p>
@@ -14047,7 +14047,7 @@
           <a:p>
             <a:fld id="{40FF0622-75E4-48B8-A617-5428CA5926CE}" type="datetimeFigureOut">
               <a:rPr lang="en-US" smtClean="0"/>
-              <a:t>3/11/2017</a:t>
+              <a:t>3/19/2017</a:t>
             </a:fld>
             <a:endParaRPr lang="en-US"/>
           </a:p>
@@ -14660,7 +14660,7 @@
           <a:p>
             <a:fld id="{40FF0622-75E4-48B8-A617-5428CA5926CE}" type="datetimeFigureOut">
               <a:rPr lang="en-US" smtClean="0"/>
-              <a:t>3/11/2017</a:t>
+              <a:t>3/19/2017</a:t>
             </a:fld>
             <a:endParaRPr lang="en-US"/>
           </a:p>
@@ -15704,6 +15704,13 @@
   <p:clrMapOvr>
     <a:masterClrMapping/>
   </p:clrMapOvr>
+  <p:timing>
+    <p:tnLst>
+      <p:par>
+        <p:cTn id="1" dur="indefinite" restart="never" nodeType="tmRoot"/>
+      </p:par>
+    </p:tnLst>
+  </p:timing>
 </p:sld>
 </file>
 
@@ -15809,6 +15816,13 @@
   <p:clrMapOvr>
     <a:masterClrMapping/>
   </p:clrMapOvr>
+  <p:timing>
+    <p:tnLst>
+      <p:par>
+        <p:cTn id="1" dur="indefinite" restart="never" nodeType="tmRoot"/>
+      </p:par>
+    </p:tnLst>
+  </p:timing>
 </p:sld>
 </file>
 
@@ -15922,6 +15936,13 @@
   <p:clrMapOvr>
     <a:masterClrMapping/>
   </p:clrMapOvr>
+  <p:timing>
+    <p:tnLst>
+      <p:par>
+        <p:cTn id="1" dur="indefinite" restart="never" nodeType="tmRoot"/>
+      </p:par>
+    </p:tnLst>
+  </p:timing>
 </p:sld>
 </file>
 
@@ -16028,13 +16049,24 @@
             <a:pPr marL="1200150" lvl="2" indent="-342900"/>
             <a:r>
               <a:rPr lang="es-ES" dirty="0"/>
-              <a:t>Se toman los archivos tal y como están en el área de preparación, y almacenan esas instantáneas de manera permanente en el directorio de </a:t>
-            </a:r>
-            <a:r>
-              <a:rPr lang="es-ES" dirty="0" err="1"/>
-              <a:t>Git</a:t>
-            </a:r>
-            <a:endParaRPr lang="es-ES" dirty="0"/>
+              <a:t>Se toman los archivos tal y como están en el área de </a:t>
+            </a:r>
+            <a:r>
+              <a:rPr lang="es-ES" dirty="0" smtClean="0"/>
+              <a:t>preparación </a:t>
+            </a:r>
+            <a:r>
+              <a:rPr lang="es-ES"/>
+              <a:t>y </a:t>
+            </a:r>
+            <a:r>
+              <a:rPr lang="es-ES" smtClean="0"/>
+              <a:t>se almacenan </a:t>
+            </a:r>
+            <a:r>
+              <a:rPr lang="es-ES" dirty="0"/>
+              <a:t>esas instantáneas de manera permanente en el directorio de Git</a:t>
+            </a:r>
           </a:p>
         </p:txBody>
       </p:sp>
@@ -16072,6 +16104,13 @@
   <p:clrMapOvr>
     <a:masterClrMapping/>
   </p:clrMapOvr>
+  <p:timing>
+    <p:tnLst>
+      <p:par>
+        <p:cTn id="1" dur="indefinite" restart="never" nodeType="tmRoot"/>
+      </p:par>
+    </p:tnLst>
+  </p:timing>
 </p:sld>
 </file>
 
@@ -16193,6 +16232,13 @@
   <p:clrMapOvr>
     <a:masterClrMapping/>
   </p:clrMapOvr>
+  <p:timing>
+    <p:tnLst>
+      <p:par>
+        <p:cTn id="1" dur="indefinite" restart="never" nodeType="tmRoot"/>
+      </p:par>
+    </p:tnLst>
+  </p:timing>
 </p:sld>
 </file>
 

</xml_diff>